<commit_message>
Updated pwpt; upload to webcourses
</commit_message>
<xml_diff>
--- a/Large Project Pitch.pptx
+++ b/Large Project Pitch.pptx
@@ -1012,7 +1012,7 @@
   <p:cSld>
     <p:spTree>
       <p:nvGrpSpPr>
-        <p:cNvPr id="207" name="Shape 207"/>
+        <p:cNvPr id="208" name="Shape 208"/>
         <p:cNvGrpSpPr/>
         <p:nvPr/>
       </p:nvGrpSpPr>
@@ -1026,7 +1026,7 @@
       </p:grpSpPr>
       <p:sp>
         <p:nvSpPr>
-          <p:cNvPr id="208" name="Shape 208"/>
+          <p:cNvPr id="209" name="Shape 209"/>
           <p:cNvSpPr/>
           <p:nvPr>
             <p:ph idx="2" type="sldImg"/>
@@ -1060,7 +1060,7 @@
       </p:sp>
       <p:sp>
         <p:nvSpPr>
-          <p:cNvPr id="209" name="Shape 209"/>
+          <p:cNvPr id="210" name="Shape 210"/>
           <p:cNvSpPr txBox="1"/>
           <p:nvPr>
             <p:ph idx="1" type="body"/>
@@ -1110,7 +1110,7 @@
   <p:cSld>
     <p:spTree>
       <p:nvGrpSpPr>
-        <p:cNvPr id="214" name="Shape 214"/>
+        <p:cNvPr id="215" name="Shape 215"/>
         <p:cNvGrpSpPr/>
         <p:nvPr/>
       </p:nvGrpSpPr>
@@ -1124,7 +1124,7 @@
       </p:grpSpPr>
       <p:sp>
         <p:nvSpPr>
-          <p:cNvPr id="215" name="Shape 215"/>
+          <p:cNvPr id="216" name="Shape 216"/>
           <p:cNvSpPr/>
           <p:nvPr>
             <p:ph idx="2" type="sldImg"/>
@@ -1158,7 +1158,7 @@
       </p:sp>
       <p:sp>
         <p:nvSpPr>
-          <p:cNvPr id="216" name="Shape 216"/>
+          <p:cNvPr id="217" name="Shape 217"/>
           <p:cNvSpPr txBox="1"/>
           <p:nvPr>
             <p:ph idx="1" type="body"/>
@@ -1208,7 +1208,7 @@
   <p:cSld>
     <p:spTree>
       <p:nvGrpSpPr>
-        <p:cNvPr id="221" name="Shape 221"/>
+        <p:cNvPr id="222" name="Shape 222"/>
         <p:cNvGrpSpPr/>
         <p:nvPr/>
       </p:nvGrpSpPr>
@@ -1222,7 +1222,7 @@
       </p:grpSpPr>
       <p:sp>
         <p:nvSpPr>
-          <p:cNvPr id="222" name="Shape 222"/>
+          <p:cNvPr id="223" name="Shape 223"/>
           <p:cNvSpPr/>
           <p:nvPr>
             <p:ph idx="2" type="sldImg"/>
@@ -1256,7 +1256,7 @@
       </p:sp>
       <p:sp>
         <p:nvSpPr>
-          <p:cNvPr id="223" name="Shape 223"/>
+          <p:cNvPr id="224" name="Shape 224"/>
           <p:cNvSpPr txBox="1"/>
           <p:nvPr>
             <p:ph idx="1" type="body"/>
@@ -10560,8 +10560,8 @@
         </p:blipFill>
         <p:spPr>
           <a:xfrm>
-            <a:off x="1397750" y="1154400"/>
-            <a:ext cx="6348499" cy="4514501"/>
+            <a:off x="1402200" y="1109825"/>
+            <a:ext cx="5346601" cy="3802048"/>
           </a:xfrm>
           <a:prstGeom prst="rect">
             <a:avLst/>
@@ -10570,6 +10570,41 @@
           <a:ln>
             <a:noFill/>
           </a:ln>
+        </p:spPr>
+      </p:pic>
+      <p:pic>
+        <p:nvPicPr>
+          <p:cNvPr id="207" name="Shape 207"/>
+          <p:cNvPicPr preferRelativeResize="0"/>
+          <p:nvPr/>
+        </p:nvPicPr>
+        <p:blipFill>
+          <a:blip r:embed="rId5">
+            <a:alphaModFix/>
+          </a:blip>
+          <a:stretch>
+            <a:fillRect/>
+          </a:stretch>
+        </p:blipFill>
+        <p:spPr>
+          <a:xfrm>
+            <a:off x="6680375" y="1997650"/>
+            <a:ext cx="1688975" cy="3004100"/>
+          </a:xfrm>
+          <a:prstGeom prst="rect">
+            <a:avLst/>
+          </a:prstGeom>
+          <a:noFill/>
+          <a:ln>
+            <a:noFill/>
+          </a:ln>
+          <a:effectLst>
+            <a:outerShdw blurRad="71438" rotWithShape="0" algn="bl" dir="10800000" dist="28575">
+              <a:srgbClr val="000000">
+                <a:alpha val="26000"/>
+              </a:srgbClr>
+            </a:outerShdw>
+          </a:effectLst>
         </p:spPr>
       </p:pic>
     </p:spTree>
@@ -10585,7 +10620,7 @@
   <p:cSld>
     <p:spTree>
       <p:nvGrpSpPr>
-        <p:cNvPr id="210" name="Shape 210"/>
+        <p:cNvPr id="211" name="Shape 211"/>
         <p:cNvGrpSpPr/>
         <p:nvPr/>
       </p:nvGrpSpPr>
@@ -10599,7 +10634,7 @@
       </p:grpSpPr>
       <p:sp>
         <p:nvSpPr>
-          <p:cNvPr id="211" name="Shape 211"/>
+          <p:cNvPr id="212" name="Shape 212"/>
           <p:cNvSpPr txBox="1"/>
           <p:nvPr>
             <p:ph idx="4294967295" type="title"/>
@@ -10639,7 +10674,7 @@
       </p:sp>
       <p:pic>
         <p:nvPicPr>
-          <p:cNvPr id="212" name="Shape 212"/>
+          <p:cNvPr id="213" name="Shape 213"/>
           <p:cNvPicPr preferRelativeResize="0"/>
           <p:nvPr/>
         </p:nvPicPr>
@@ -10667,7 +10702,7 @@
       </p:pic>
       <p:sp>
         <p:nvSpPr>
-          <p:cNvPr id="213" name="Shape 213"/>
+          <p:cNvPr id="214" name="Shape 214"/>
           <p:cNvSpPr txBox="1"/>
           <p:nvPr>
             <p:ph idx="4294967295" type="body"/>
@@ -10782,7 +10817,7 @@
   <p:cSld>
     <p:spTree>
       <p:nvGrpSpPr>
-        <p:cNvPr id="217" name="Shape 217"/>
+        <p:cNvPr id="218" name="Shape 218"/>
         <p:cNvGrpSpPr/>
         <p:nvPr/>
       </p:nvGrpSpPr>
@@ -10796,7 +10831,7 @@
       </p:grpSpPr>
       <p:sp>
         <p:nvSpPr>
-          <p:cNvPr id="218" name="Shape 218"/>
+          <p:cNvPr id="219" name="Shape 219"/>
           <p:cNvSpPr txBox="1"/>
           <p:nvPr>
             <p:ph idx="4294967295" type="title"/>
@@ -10836,7 +10871,7 @@
       </p:sp>
       <p:pic>
         <p:nvPicPr>
-          <p:cNvPr id="219" name="Shape 219"/>
+          <p:cNvPr id="220" name="Shape 220"/>
           <p:cNvPicPr preferRelativeResize="0"/>
           <p:nvPr/>
         </p:nvPicPr>
@@ -10864,7 +10899,7 @@
       </p:pic>
       <p:sp>
         <p:nvSpPr>
-          <p:cNvPr id="220" name="Shape 220"/>
+          <p:cNvPr id="221" name="Shape 221"/>
           <p:cNvSpPr txBox="1"/>
           <p:nvPr>
             <p:ph idx="4294967295" type="body"/>
@@ -11014,7 +11049,7 @@
   <p:cSld>
     <p:spTree>
       <p:nvGrpSpPr>
-        <p:cNvPr id="224" name="Shape 224"/>
+        <p:cNvPr id="225" name="Shape 225"/>
         <p:cNvGrpSpPr/>
         <p:nvPr/>
       </p:nvGrpSpPr>
@@ -11028,7 +11063,7 @@
       </p:grpSpPr>
       <p:pic>
         <p:nvPicPr>
-          <p:cNvPr id="225" name="Shape 225"/>
+          <p:cNvPr id="226" name="Shape 226"/>
           <p:cNvPicPr preferRelativeResize="0"/>
           <p:nvPr/>
         </p:nvPicPr>

</xml_diff>